<commit_message>
Fine tuning part 2
</commit_message>
<xml_diff>
--- a/Data Science salary prediction in USA.pptx
+++ b/Data Science salary prediction in USA.pptx
@@ -116,6 +116,14 @@
       </a:defRPr>
     </a:lvl9pPr>
   </p:defaultTextStyle>
+  <p:extLst>
+    <p:ext uri="{EFAFB233-063F-42B5-8137-9DF3F51BA10A}">
+      <p15:sldGuideLst xmlns:p15="http://schemas.microsoft.com/office/powerpoint/2012/main"/>
+    </p:ext>
+    <p:ext uri="{2D200454-40CA-4A62-9FC3-DE9A4176ACB9}">
+      <p15:notesGuideLst xmlns:p15="http://schemas.microsoft.com/office/powerpoint/2012/main"/>
+    </p:ext>
+  </p:extLst>
 </p:presentation>
 </file>
 
@@ -861,7 +869,7 @@
           <a:p>
             <a:fld id="{3C12292A-22E8-420B-BBB6-EF380A99A985}" type="datetimeFigureOut">
               <a:rPr lang="en-CA" smtClean="0"/>
-              <a:t>2023-08-15</a:t>
+              <a:t>2023-08-16</a:t>
             </a:fld>
             <a:endParaRPr lang="en-CA" dirty="0"/>
           </a:p>
@@ -1075,7 +1083,7 @@
           <a:p>
             <a:fld id="{3C12292A-22E8-420B-BBB6-EF380A99A985}" type="datetimeFigureOut">
               <a:rPr lang="en-CA" smtClean="0"/>
-              <a:t>2023-08-15</a:t>
+              <a:t>2023-08-16</a:t>
             </a:fld>
             <a:endParaRPr lang="en-CA" dirty="0"/>
           </a:p>
@@ -1350,7 +1358,7 @@
           <a:p>
             <a:fld id="{3C12292A-22E8-420B-BBB6-EF380A99A985}" type="datetimeFigureOut">
               <a:rPr lang="en-CA" smtClean="0"/>
-              <a:t>2023-08-15</a:t>
+              <a:t>2023-08-16</a:t>
             </a:fld>
             <a:endParaRPr lang="en-CA" dirty="0"/>
           </a:p>
@@ -3159,7 +3167,7 @@
           <a:p>
             <a:fld id="{3C12292A-22E8-420B-BBB6-EF380A99A985}" type="datetimeFigureOut">
               <a:rPr lang="en-CA" smtClean="0"/>
-              <a:t>2023-08-15</a:t>
+              <a:t>2023-08-16</a:t>
             </a:fld>
             <a:endParaRPr lang="en-CA" dirty="0"/>
           </a:p>
@@ -9575,7 +9583,7 @@
           <a:p>
             <a:fld id="{3C12292A-22E8-420B-BBB6-EF380A99A985}" type="datetimeFigureOut">
               <a:rPr lang="en-CA" smtClean="0"/>
-              <a:t>2023-08-15</a:t>
+              <a:t>2023-08-16</a:t>
             </a:fld>
             <a:endParaRPr lang="en-CA" dirty="0"/>
           </a:p>
@@ -11966,7 +11974,7 @@
           <a:p>
             <a:fld id="{3C12292A-22E8-420B-BBB6-EF380A99A985}" type="datetimeFigureOut">
               <a:rPr lang="en-CA" smtClean="0"/>
-              <a:t>2023-08-15</a:t>
+              <a:t>2023-08-16</a:t>
             </a:fld>
             <a:endParaRPr lang="en-CA" dirty="0"/>
           </a:p>
@@ -12211,7 +12219,7 @@
           <a:p>
             <a:fld id="{3C12292A-22E8-420B-BBB6-EF380A99A985}" type="datetimeFigureOut">
               <a:rPr lang="en-CA" smtClean="0"/>
-              <a:t>2023-08-15</a:t>
+              <a:t>2023-08-16</a:t>
             </a:fld>
             <a:endParaRPr lang="en-CA" dirty="0"/>
           </a:p>
@@ -12541,7 +12549,7 @@
           <a:p>
             <a:fld id="{3C12292A-22E8-420B-BBB6-EF380A99A985}" type="datetimeFigureOut">
               <a:rPr lang="en-CA" smtClean="0"/>
-              <a:t>2023-08-15</a:t>
+              <a:t>2023-08-16</a:t>
             </a:fld>
             <a:endParaRPr lang="en-CA" dirty="0"/>
           </a:p>
@@ -12808,7 +12816,7 @@
           <a:p>
             <a:fld id="{3C12292A-22E8-420B-BBB6-EF380A99A985}" type="datetimeFigureOut">
               <a:rPr lang="en-CA" smtClean="0"/>
-              <a:t>2023-08-15</a:t>
+              <a:t>2023-08-16</a:t>
             </a:fld>
             <a:endParaRPr lang="en-CA" dirty="0"/>
           </a:p>
@@ -13189,7 +13197,7 @@
           <a:p>
             <a:fld id="{3C12292A-22E8-420B-BBB6-EF380A99A985}" type="datetimeFigureOut">
               <a:rPr lang="en-CA" smtClean="0"/>
-              <a:t>2023-08-15</a:t>
+              <a:t>2023-08-16</a:t>
             </a:fld>
             <a:endParaRPr lang="en-CA" dirty="0"/>
           </a:p>
@@ -13358,7 +13366,7 @@
           <a:p>
             <a:fld id="{3C12292A-22E8-420B-BBB6-EF380A99A985}" type="datetimeFigureOut">
               <a:rPr lang="en-CA" smtClean="0"/>
-              <a:t>2023-08-15</a:t>
+              <a:t>2023-08-16</a:t>
             </a:fld>
             <a:endParaRPr lang="en-CA" dirty="0"/>
           </a:p>
@@ -13471,7 +13479,7 @@
           <a:p>
             <a:fld id="{3C12292A-22E8-420B-BBB6-EF380A99A985}" type="datetimeFigureOut">
               <a:rPr lang="en-CA" smtClean="0"/>
-              <a:t>2023-08-15</a:t>
+              <a:t>2023-08-16</a:t>
             </a:fld>
             <a:endParaRPr lang="en-CA" dirty="0"/>
           </a:p>
@@ -13748,7 +13756,7 @@
           <a:p>
             <a:fld id="{3C12292A-22E8-420B-BBB6-EF380A99A985}" type="datetimeFigureOut">
               <a:rPr lang="en-CA" smtClean="0"/>
-              <a:t>2023-08-15</a:t>
+              <a:t>2023-08-16</a:t>
             </a:fld>
             <a:endParaRPr lang="en-CA" dirty="0"/>
           </a:p>
@@ -14040,7 +14048,7 @@
           <a:p>
             <a:fld id="{3C12292A-22E8-420B-BBB6-EF380A99A985}" type="datetimeFigureOut">
               <a:rPr lang="en-CA" smtClean="0"/>
-              <a:t>2023-08-15</a:t>
+              <a:t>2023-08-16</a:t>
             </a:fld>
             <a:endParaRPr lang="en-CA" dirty="0"/>
           </a:p>
@@ -14376,7 +14384,7 @@
           <a:p>
             <a:fld id="{3C12292A-22E8-420B-BBB6-EF380A99A985}" type="datetimeFigureOut">
               <a:rPr lang="en-CA" smtClean="0"/>
-              <a:t>2023-08-15</a:t>
+              <a:t>2023-08-16</a:t>
             </a:fld>
             <a:endParaRPr lang="en-CA" dirty="0"/>
           </a:p>

</xml_diff>

<commit_message>
Deployed model with results
</commit_message>
<xml_diff>
--- a/Data Science salary prediction in USA.pptx
+++ b/Data Science salary prediction in USA.pptx
@@ -5,7 +5,7 @@
     <p:sldMasterId id="2147483660" r:id="rId1"/>
   </p:sldMasterIdLst>
   <p:notesMasterIdLst>
-    <p:notesMasterId r:id="rId12"/>
+    <p:notesMasterId r:id="rId13"/>
   </p:notesMasterIdLst>
   <p:sldIdLst>
     <p:sldId id="256" r:id="rId2"/>
@@ -17,7 +17,8 @@
     <p:sldId id="262" r:id="rId8"/>
     <p:sldId id="263" r:id="rId9"/>
     <p:sldId id="264" r:id="rId10"/>
-    <p:sldId id="265" r:id="rId11"/>
+    <p:sldId id="266" r:id="rId11"/>
+    <p:sldId id="265" r:id="rId12"/>
   </p:sldIdLst>
   <p:sldSz cx="12192000" cy="6858000"/>
   <p:notesSz cx="6858000" cy="9144000"/>
@@ -209,7 +210,7 @@
           <a:p>
             <a:fld id="{40A4D192-3EDF-4276-B3D9-4FEF8793596A}" type="datetimeFigureOut">
               <a:rPr lang="en-CA" smtClean="0"/>
-              <a:t>2023-08-16</a:t>
+              <a:t>2023-08-17</a:t>
             </a:fld>
             <a:endParaRPr lang="en-CA" dirty="0"/>
           </a:p>
@@ -869,7 +870,7 @@
           <a:p>
             <a:fld id="{3C12292A-22E8-420B-BBB6-EF380A99A985}" type="datetimeFigureOut">
               <a:rPr lang="en-CA" smtClean="0"/>
-              <a:t>2023-08-16</a:t>
+              <a:t>2023-08-17</a:t>
             </a:fld>
             <a:endParaRPr lang="en-CA" dirty="0"/>
           </a:p>
@@ -1083,7 +1084,7 @@
           <a:p>
             <a:fld id="{3C12292A-22E8-420B-BBB6-EF380A99A985}" type="datetimeFigureOut">
               <a:rPr lang="en-CA" smtClean="0"/>
-              <a:t>2023-08-16</a:t>
+              <a:t>2023-08-17</a:t>
             </a:fld>
             <a:endParaRPr lang="en-CA" dirty="0"/>
           </a:p>
@@ -1358,7 +1359,7 @@
           <a:p>
             <a:fld id="{3C12292A-22E8-420B-BBB6-EF380A99A985}" type="datetimeFigureOut">
               <a:rPr lang="en-CA" smtClean="0"/>
-              <a:t>2023-08-16</a:t>
+              <a:t>2023-08-17</a:t>
             </a:fld>
             <a:endParaRPr lang="en-CA" dirty="0"/>
           </a:p>
@@ -3167,7 +3168,7 @@
           <a:p>
             <a:fld id="{3C12292A-22E8-420B-BBB6-EF380A99A985}" type="datetimeFigureOut">
               <a:rPr lang="en-CA" smtClean="0"/>
-              <a:t>2023-08-16</a:t>
+              <a:t>2023-08-17</a:t>
             </a:fld>
             <a:endParaRPr lang="en-CA" dirty="0"/>
           </a:p>
@@ -9583,7 +9584,7 @@
           <a:p>
             <a:fld id="{3C12292A-22E8-420B-BBB6-EF380A99A985}" type="datetimeFigureOut">
               <a:rPr lang="en-CA" smtClean="0"/>
-              <a:t>2023-08-16</a:t>
+              <a:t>2023-08-17</a:t>
             </a:fld>
             <a:endParaRPr lang="en-CA" dirty="0"/>
           </a:p>
@@ -11974,7 +11975,7 @@
           <a:p>
             <a:fld id="{3C12292A-22E8-420B-BBB6-EF380A99A985}" type="datetimeFigureOut">
               <a:rPr lang="en-CA" smtClean="0"/>
-              <a:t>2023-08-16</a:t>
+              <a:t>2023-08-17</a:t>
             </a:fld>
             <a:endParaRPr lang="en-CA" dirty="0"/>
           </a:p>
@@ -12219,7 +12220,7 @@
           <a:p>
             <a:fld id="{3C12292A-22E8-420B-BBB6-EF380A99A985}" type="datetimeFigureOut">
               <a:rPr lang="en-CA" smtClean="0"/>
-              <a:t>2023-08-16</a:t>
+              <a:t>2023-08-17</a:t>
             </a:fld>
             <a:endParaRPr lang="en-CA" dirty="0"/>
           </a:p>
@@ -12549,7 +12550,7 @@
           <a:p>
             <a:fld id="{3C12292A-22E8-420B-BBB6-EF380A99A985}" type="datetimeFigureOut">
               <a:rPr lang="en-CA" smtClean="0"/>
-              <a:t>2023-08-16</a:t>
+              <a:t>2023-08-17</a:t>
             </a:fld>
             <a:endParaRPr lang="en-CA" dirty="0"/>
           </a:p>
@@ -12816,7 +12817,7 @@
           <a:p>
             <a:fld id="{3C12292A-22E8-420B-BBB6-EF380A99A985}" type="datetimeFigureOut">
               <a:rPr lang="en-CA" smtClean="0"/>
-              <a:t>2023-08-16</a:t>
+              <a:t>2023-08-17</a:t>
             </a:fld>
             <a:endParaRPr lang="en-CA" dirty="0"/>
           </a:p>
@@ -13197,7 +13198,7 @@
           <a:p>
             <a:fld id="{3C12292A-22E8-420B-BBB6-EF380A99A985}" type="datetimeFigureOut">
               <a:rPr lang="en-CA" smtClean="0"/>
-              <a:t>2023-08-16</a:t>
+              <a:t>2023-08-17</a:t>
             </a:fld>
             <a:endParaRPr lang="en-CA" dirty="0"/>
           </a:p>
@@ -13366,7 +13367,7 @@
           <a:p>
             <a:fld id="{3C12292A-22E8-420B-BBB6-EF380A99A985}" type="datetimeFigureOut">
               <a:rPr lang="en-CA" smtClean="0"/>
-              <a:t>2023-08-16</a:t>
+              <a:t>2023-08-17</a:t>
             </a:fld>
             <a:endParaRPr lang="en-CA" dirty="0"/>
           </a:p>
@@ -13479,7 +13480,7 @@
           <a:p>
             <a:fld id="{3C12292A-22E8-420B-BBB6-EF380A99A985}" type="datetimeFigureOut">
               <a:rPr lang="en-CA" smtClean="0"/>
-              <a:t>2023-08-16</a:t>
+              <a:t>2023-08-17</a:t>
             </a:fld>
             <a:endParaRPr lang="en-CA" dirty="0"/>
           </a:p>
@@ -13756,7 +13757,7 @@
           <a:p>
             <a:fld id="{3C12292A-22E8-420B-BBB6-EF380A99A985}" type="datetimeFigureOut">
               <a:rPr lang="en-CA" smtClean="0"/>
-              <a:t>2023-08-16</a:t>
+              <a:t>2023-08-17</a:t>
             </a:fld>
             <a:endParaRPr lang="en-CA" dirty="0"/>
           </a:p>
@@ -14048,7 +14049,7 @@
           <a:p>
             <a:fld id="{3C12292A-22E8-420B-BBB6-EF380A99A985}" type="datetimeFigureOut">
               <a:rPr lang="en-CA" smtClean="0"/>
-              <a:t>2023-08-16</a:t>
+              <a:t>2023-08-17</a:t>
             </a:fld>
             <a:endParaRPr lang="en-CA" dirty="0"/>
           </a:p>
@@ -14384,7 +14385,7 @@
           <a:p>
             <a:fld id="{3C12292A-22E8-420B-BBB6-EF380A99A985}" type="datetimeFigureOut">
               <a:rPr lang="en-CA" smtClean="0"/>
-              <a:t>2023-08-16</a:t>
+              <a:t>2023-08-17</a:t>
             </a:fld>
             <a:endParaRPr lang="en-CA" dirty="0"/>
           </a:p>
@@ -14892,6 +14893,203 @@
 <file path=ppt/slides/slide10.xml><?xml version="1.0" encoding="utf-8"?>
 <p:sld xmlns:a="http://schemas.openxmlformats.org/drawingml/2006/main" xmlns:r="http://schemas.openxmlformats.org/officeDocument/2006/relationships" xmlns:p="http://schemas.openxmlformats.org/presentationml/2006/main">
   <p:cSld>
+    <p:bg>
+      <p:bgPr>
+        <a:solidFill>
+          <a:schemeClr val="bg1"/>
+        </a:solidFill>
+        <a:effectLst/>
+      </p:bgPr>
+    </p:bg>
+    <p:spTree>
+      <p:nvGrpSpPr>
+        <p:cNvPr id="1" name=""/>
+        <p:cNvGrpSpPr/>
+        <p:nvPr/>
+      </p:nvGrpSpPr>
+      <p:grpSpPr>
+        <a:xfrm>
+          <a:off x="0" y="0"/>
+          <a:ext cx="0" cy="0"/>
+          <a:chOff x="0" y="0"/>
+          <a:chExt cx="0" cy="0"/>
+        </a:xfrm>
+      </p:grpSpPr>
+      <p:sp useBgFill="1">
+        <p:nvSpPr>
+          <p:cNvPr id="10" name="Rectangle 9">
+            <a:extLst>
+              <a:ext uri="{FF2B5EF4-FFF2-40B4-BE49-F238E27FC236}">
+                <a16:creationId xmlns:a16="http://schemas.microsoft.com/office/drawing/2014/main" id="{6BC377B7-18F1-42AD-A1DD-E1D6A5B27CE9}"/>
+              </a:ext>
+              <a:ext uri="{C183D7F6-B498-43B3-948B-1728B52AA6E4}">
+                <adec:decorative xmlns:adec="http://schemas.microsoft.com/office/drawing/2017/decorative" val="1"/>
+              </a:ext>
+            </a:extLst>
+          </p:cNvPr>
+          <p:cNvSpPr>
+            <a:spLocks noGrp="1" noRot="1" noChangeAspect="1" noMove="1" noResize="1" noEditPoints="1" noAdjustHandles="1" noChangeArrowheads="1" noChangeShapeType="1" noTextEdit="1"/>
+          </p:cNvSpPr>
+          <p:nvPr>
+            <p:extLst>
+              <p:ext uri="{386F3935-93C4-4BCD-93E2-E3B085C9AB24}">
+                <p16:designElem xmlns:p16="http://schemas.microsoft.com/office/powerpoint/2015/main" val="1"/>
+              </p:ext>
+            </p:extLst>
+          </p:nvPr>
+        </p:nvSpPr>
+        <p:spPr>
+          <a:xfrm>
+            <a:off x="0" y="0"/>
+            <a:ext cx="12192000" cy="6858000"/>
+          </a:xfrm>
+          <a:prstGeom prst="rect">
+            <a:avLst/>
+          </a:prstGeom>
+          <a:ln>
+            <a:noFill/>
+          </a:ln>
+        </p:spPr>
+        <p:style>
+          <a:lnRef idx="2">
+            <a:schemeClr val="accent1">
+              <a:shade val="50000"/>
+            </a:schemeClr>
+          </a:lnRef>
+          <a:fillRef idx="1">
+            <a:schemeClr val="accent1"/>
+          </a:fillRef>
+          <a:effectRef idx="0">
+            <a:schemeClr val="accent1"/>
+          </a:effectRef>
+          <a:fontRef idx="minor">
+            <a:schemeClr val="lt1"/>
+          </a:fontRef>
+        </p:style>
+        <p:txBody>
+          <a:bodyPr rtlCol="0" anchor="ctr"/>
+          <a:lstStyle/>
+          <a:p>
+            <a:pPr algn="ctr"/>
+            <a:endParaRPr lang="en-US"/>
+          </a:p>
+        </p:txBody>
+      </p:sp>
+      <p:sp>
+        <p:nvSpPr>
+          <p:cNvPr id="12" name="Rectangle 11">
+            <a:extLst>
+              <a:ext uri="{FF2B5EF4-FFF2-40B4-BE49-F238E27FC236}">
+                <a16:creationId xmlns:a16="http://schemas.microsoft.com/office/drawing/2014/main" id="{D8CD3F60-224B-4A33-8366-65BAA0E6ECD1}"/>
+              </a:ext>
+              <a:ext uri="{C183D7F6-B498-43B3-948B-1728B52AA6E4}">
+                <adec:decorative xmlns:adec="http://schemas.microsoft.com/office/drawing/2017/decorative" val="1"/>
+              </a:ext>
+            </a:extLst>
+          </p:cNvPr>
+          <p:cNvSpPr>
+            <a:spLocks noGrp="1" noRot="1" noChangeAspect="1" noMove="1" noResize="1" noEditPoints="1" noAdjustHandles="1" noChangeArrowheads="1" noChangeShapeType="1" noTextEdit="1"/>
+          </p:cNvSpPr>
+          <p:nvPr>
+            <p:extLst>
+              <p:ext uri="{386F3935-93C4-4BCD-93E2-E3B085C9AB24}">
+                <p16:designElem xmlns:p16="http://schemas.microsoft.com/office/powerpoint/2015/main" val="1"/>
+              </p:ext>
+            </p:extLst>
+          </p:nvPr>
+        </p:nvSpPr>
+        <p:spPr>
+          <a:xfrm>
+            <a:off x="0" y="4206240"/>
+            <a:ext cx="12192000" cy="2651760"/>
+          </a:xfrm>
+          <a:prstGeom prst="rect">
+            <a:avLst/>
+          </a:prstGeom>
+          <a:solidFill>
+            <a:schemeClr val="tx1"/>
+          </a:solidFill>
+          <a:ln>
+            <a:noFill/>
+          </a:ln>
+        </p:spPr>
+        <p:style>
+          <a:lnRef idx="2">
+            <a:schemeClr val="accent1">
+              <a:shade val="50000"/>
+            </a:schemeClr>
+          </a:lnRef>
+          <a:fillRef idx="1">
+            <a:schemeClr val="accent1"/>
+          </a:fillRef>
+          <a:effectRef idx="0">
+            <a:schemeClr val="accent1"/>
+          </a:effectRef>
+          <a:fontRef idx="minor">
+            <a:schemeClr val="lt1"/>
+          </a:fontRef>
+        </p:style>
+        <p:txBody>
+          <a:bodyPr rtlCol="0" anchor="ctr"/>
+          <a:lstStyle/>
+          <a:p>
+            <a:pPr algn="ctr"/>
+            <a:endParaRPr lang="en-US"/>
+          </a:p>
+        </p:txBody>
+      </p:sp>
+      <p:pic>
+        <p:nvPicPr>
+          <p:cNvPr id="5" name="Picture 4" descr="A graph with blue dots and red line&#10;&#10;Description automatically generated">
+            <a:extLst>
+              <a:ext uri="{FF2B5EF4-FFF2-40B4-BE49-F238E27FC236}">
+                <a16:creationId xmlns:a16="http://schemas.microsoft.com/office/drawing/2014/main" id="{7C508E8A-7FD6-A267-9549-75C6FB7DC03F}"/>
+              </a:ext>
+            </a:extLst>
+          </p:cNvPr>
+          <p:cNvPicPr>
+            <a:picLocks noChangeAspect="1"/>
+          </p:cNvPicPr>
+          <p:nvPr/>
+        </p:nvPicPr>
+        <p:blipFill>
+          <a:blip r:embed="rId2">
+            <a:extLst>
+              <a:ext uri="{28A0092B-C50C-407E-A947-70E740481C1C}">
+                <a14:useLocalDpi xmlns:a14="http://schemas.microsoft.com/office/drawing/2010/main" val="0"/>
+              </a:ext>
+            </a:extLst>
+          </a:blip>
+          <a:stretch>
+            <a:fillRect/>
+          </a:stretch>
+        </p:blipFill>
+        <p:spPr>
+          <a:xfrm>
+            <a:off x="1760541" y="643467"/>
+            <a:ext cx="8670917" cy="5571066"/>
+          </a:xfrm>
+          <a:prstGeom prst="rect">
+            <a:avLst/>
+          </a:prstGeom>
+        </p:spPr>
+      </p:pic>
+    </p:spTree>
+    <p:extLst>
+      <p:ext uri="{BB962C8B-B14F-4D97-AF65-F5344CB8AC3E}">
+        <p14:creationId xmlns:p14="http://schemas.microsoft.com/office/powerpoint/2010/main" val="2887365199"/>
+      </p:ext>
+    </p:extLst>
+  </p:cSld>
+  <p:clrMapOvr>
+    <a:overrideClrMapping bg1="dk1" tx1="lt1" bg2="dk2" tx2="lt2" accent1="accent1" accent2="accent2" accent3="accent3" accent4="accent4" accent5="accent5" accent6="accent6" hlink="hlink" folHlink="folHlink"/>
+  </p:clrMapOvr>
+</p:sld>
+</file>
+
+<file path=ppt/slides/slide11.xml><?xml version="1.0" encoding="utf-8"?>
+<p:sld xmlns:a="http://schemas.openxmlformats.org/drawingml/2006/main" xmlns:r="http://schemas.openxmlformats.org/officeDocument/2006/relationships" xmlns:p="http://schemas.openxmlformats.org/presentationml/2006/main">
+  <p:cSld>
     <p:spTree>
       <p:nvGrpSpPr>
         <p:cNvPr id="1" name=""/>
@@ -16590,6 +16788,14 @@
 <file path=ppt/slides/slide9.xml><?xml version="1.0" encoding="utf-8"?>
 <p:sld xmlns:a="http://schemas.openxmlformats.org/drawingml/2006/main" xmlns:r="http://schemas.openxmlformats.org/officeDocument/2006/relationships" xmlns:p="http://schemas.openxmlformats.org/presentationml/2006/main">
   <p:cSld>
+    <p:bg>
+      <p:bgPr>
+        <a:solidFill>
+          <a:schemeClr val="bg1"/>
+        </a:solidFill>
+        <a:effectLst/>
+      </p:bgPr>
+    </p:bg>
     <p:spTree>
       <p:nvGrpSpPr>
         <p:cNvPr id="1" name=""/>
@@ -16606,6 +16812,192 @@
       </p:grpSpPr>
       <p:sp>
         <p:nvSpPr>
+          <p:cNvPr id="7" name="Rectangle 6">
+            <a:extLst>
+              <a:ext uri="{FF2B5EF4-FFF2-40B4-BE49-F238E27FC236}">
+                <a16:creationId xmlns:a16="http://schemas.microsoft.com/office/drawing/2014/main" id="{09A1C012-8297-4361-ACE8-A2509FB18911}"/>
+              </a:ext>
+              <a:ext uri="{C183D7F6-B498-43B3-948B-1728B52AA6E4}">
+                <adec:decorative xmlns:adec="http://schemas.microsoft.com/office/drawing/2017/decorative" val="1"/>
+              </a:ext>
+            </a:extLst>
+          </p:cNvPr>
+          <p:cNvSpPr>
+            <a:spLocks noGrp="1" noRot="1" noChangeAspect="1" noMove="1" noResize="1" noEditPoints="1" noAdjustHandles="1" noChangeArrowheads="1" noChangeShapeType="1" noTextEdit="1"/>
+          </p:cNvSpPr>
+          <p:nvPr>
+            <p:extLst>
+              <p:ext uri="{386F3935-93C4-4BCD-93E2-E3B085C9AB24}">
+                <p16:designElem xmlns:p16="http://schemas.microsoft.com/office/powerpoint/2015/main" val="1"/>
+              </p:ext>
+            </p:extLst>
+          </p:nvPr>
+        </p:nvSpPr>
+        <p:spPr>
+          <a:xfrm>
+            <a:off x="0" y="4206240"/>
+            <a:ext cx="12192000" cy="2651760"/>
+          </a:xfrm>
+          <a:prstGeom prst="rect">
+            <a:avLst/>
+          </a:prstGeom>
+          <a:solidFill>
+            <a:schemeClr val="tx1"/>
+          </a:solidFill>
+          <a:ln>
+            <a:noFill/>
+          </a:ln>
+        </p:spPr>
+        <p:style>
+          <a:lnRef idx="2">
+            <a:schemeClr val="accent1">
+              <a:shade val="50000"/>
+            </a:schemeClr>
+          </a:lnRef>
+          <a:fillRef idx="1">
+            <a:schemeClr val="accent1"/>
+          </a:fillRef>
+          <a:effectRef idx="0">
+            <a:schemeClr val="accent1"/>
+          </a:effectRef>
+          <a:fontRef idx="minor">
+            <a:schemeClr val="lt1"/>
+          </a:fontRef>
+        </p:style>
+        <p:txBody>
+          <a:bodyPr rtlCol="0" anchor="ctr"/>
+          <a:lstStyle/>
+          <a:p>
+            <a:pPr algn="ctr"/>
+            <a:endParaRPr lang="en-US"/>
+          </a:p>
+        </p:txBody>
+      </p:sp>
+      <p:sp useBgFill="1">
+        <p:nvSpPr>
+          <p:cNvPr id="9" name="Rectangle 8">
+            <a:extLst>
+              <a:ext uri="{FF2B5EF4-FFF2-40B4-BE49-F238E27FC236}">
+                <a16:creationId xmlns:a16="http://schemas.microsoft.com/office/drawing/2014/main" id="{4AA13AD3-0A4F-475A-BEBB-DEEFF5C096C3}"/>
+              </a:ext>
+              <a:ext uri="{C183D7F6-B498-43B3-948B-1728B52AA6E4}">
+                <adec:decorative xmlns:adec="http://schemas.microsoft.com/office/drawing/2017/decorative" val="1"/>
+              </a:ext>
+            </a:extLst>
+          </p:cNvPr>
+          <p:cNvSpPr>
+            <a:spLocks noGrp="1" noRot="1" noChangeAspect="1" noMove="1" noResize="1" noEditPoints="1" noAdjustHandles="1" noChangeArrowheads="1" noChangeShapeType="1" noTextEdit="1"/>
+          </p:cNvSpPr>
+          <p:nvPr>
+            <p:extLst>
+              <p:ext uri="{386F3935-93C4-4BCD-93E2-E3B085C9AB24}">
+                <p16:designElem xmlns:p16="http://schemas.microsoft.com/office/powerpoint/2015/main" val="1"/>
+              </p:ext>
+            </p:extLst>
+          </p:nvPr>
+        </p:nvSpPr>
+        <p:spPr>
+          <a:xfrm>
+            <a:off x="0" y="0"/>
+            <a:ext cx="12192000" cy="6858000"/>
+          </a:xfrm>
+          <a:prstGeom prst="rect">
+            <a:avLst/>
+          </a:prstGeom>
+          <a:ln>
+            <a:noFill/>
+          </a:ln>
+        </p:spPr>
+        <p:style>
+          <a:lnRef idx="2">
+            <a:schemeClr val="accent1">
+              <a:shade val="50000"/>
+            </a:schemeClr>
+          </a:lnRef>
+          <a:fillRef idx="1">
+            <a:schemeClr val="accent1"/>
+          </a:fillRef>
+          <a:effectRef idx="0">
+            <a:schemeClr val="accent1"/>
+          </a:effectRef>
+          <a:fontRef idx="minor">
+            <a:schemeClr val="lt1"/>
+          </a:fontRef>
+        </p:style>
+        <p:txBody>
+          <a:bodyPr rtlCol="0" anchor="ctr"/>
+          <a:lstStyle/>
+          <a:p>
+            <a:pPr algn="ctr"/>
+            <a:endParaRPr lang="en-US"/>
+          </a:p>
+        </p:txBody>
+      </p:sp>
+      <p:sp>
+        <p:nvSpPr>
+          <p:cNvPr id="11" name="Rectangle 10">
+            <a:extLst>
+              <a:ext uri="{FF2B5EF4-FFF2-40B4-BE49-F238E27FC236}">
+                <a16:creationId xmlns:a16="http://schemas.microsoft.com/office/drawing/2014/main" id="{205BB74C-33FB-4335-8808-49E247F7BF75}"/>
+              </a:ext>
+              <a:ext uri="{C183D7F6-B498-43B3-948B-1728B52AA6E4}">
+                <adec:decorative xmlns:adec="http://schemas.microsoft.com/office/drawing/2017/decorative" val="1"/>
+              </a:ext>
+            </a:extLst>
+          </p:cNvPr>
+          <p:cNvSpPr>
+            <a:spLocks noGrp="1" noRot="1" noChangeAspect="1" noMove="1" noResize="1" noEditPoints="1" noAdjustHandles="1" noChangeArrowheads="1" noChangeShapeType="1" noTextEdit="1"/>
+          </p:cNvSpPr>
+          <p:nvPr>
+            <p:extLst>
+              <p:ext uri="{386F3935-93C4-4BCD-93E2-E3B085C9AB24}">
+                <p16:designElem xmlns:p16="http://schemas.microsoft.com/office/powerpoint/2015/main" val="1"/>
+              </p:ext>
+            </p:extLst>
+          </p:nvPr>
+        </p:nvSpPr>
+        <p:spPr>
+          <a:xfrm>
+            <a:off x="1" y="1225106"/>
+            <a:ext cx="12192000" cy="3788958"/>
+          </a:xfrm>
+          <a:prstGeom prst="rect">
+            <a:avLst/>
+          </a:prstGeom>
+          <a:solidFill>
+            <a:schemeClr val="tx1"/>
+          </a:solidFill>
+          <a:ln>
+            <a:noFill/>
+          </a:ln>
+        </p:spPr>
+        <p:style>
+          <a:lnRef idx="2">
+            <a:schemeClr val="accent1">
+              <a:shade val="50000"/>
+            </a:schemeClr>
+          </a:lnRef>
+          <a:fillRef idx="1">
+            <a:schemeClr val="accent1"/>
+          </a:fillRef>
+          <a:effectRef idx="0">
+            <a:schemeClr val="accent1"/>
+          </a:effectRef>
+          <a:fontRef idx="minor">
+            <a:schemeClr val="lt1"/>
+          </a:fontRef>
+        </p:style>
+        <p:txBody>
+          <a:bodyPr rtlCol="0" anchor="ctr"/>
+          <a:lstStyle/>
+          <a:p>
+            <a:pPr algn="ctr"/>
+            <a:endParaRPr lang="en-US"/>
+          </a:p>
+        </p:txBody>
+      </p:sp>
+      <p:sp>
+        <p:nvSpPr>
           <p:cNvPr id="2" name="Title 1">
             <a:extLst>
               <a:ext uri="{FF2B5EF4-FFF2-40B4-BE49-F238E27FC236}">
@@ -16620,42 +17012,30 @@
             <p:ph type="title"/>
           </p:nvPr>
         </p:nvSpPr>
-        <p:spPr/>
-        <p:txBody>
-          <a:bodyPr>
+        <p:spPr>
+          <a:xfrm>
+            <a:off x="960120" y="1841412"/>
+            <a:ext cx="10268712" cy="2688020"/>
+          </a:xfrm>
+        </p:spPr>
+        <p:txBody>
+          <a:bodyPr vert="horz" lIns="91440" tIns="45720" rIns="91440" bIns="45720" rtlCol="0" anchor="ctr">
             <a:normAutofit/>
           </a:bodyPr>
           <a:lstStyle/>
           <a:p>
             <a:r>
-              <a:rPr lang="en-CA" dirty="0"/>
-              <a:t>15-year salary prediction </a:t>
+              <a:rPr lang="en-US" sz="8800" dirty="0"/>
+              <a:t>5-year </a:t>
             </a:r>
-          </a:p>
-        </p:txBody>
-      </p:sp>
-      <p:sp>
-        <p:nvSpPr>
-          <p:cNvPr id="3" name="Content Placeholder 2">
-            <a:extLst>
-              <a:ext uri="{FF2B5EF4-FFF2-40B4-BE49-F238E27FC236}">
-                <a16:creationId xmlns:a16="http://schemas.microsoft.com/office/drawing/2014/main" id="{146B2389-6963-7DB7-0BFA-F94388A3DBA4}"/>
-              </a:ext>
-            </a:extLst>
-          </p:cNvPr>
-          <p:cNvSpPr>
-            <a:spLocks noGrp="1"/>
-          </p:cNvSpPr>
-          <p:nvPr>
-            <p:ph idx="1"/>
-          </p:nvPr>
-        </p:nvSpPr>
-        <p:spPr/>
-        <p:txBody>
-          <a:bodyPr/>
-          <a:lstStyle/>
-          <a:p>
-            <a:endParaRPr lang="en-CA" dirty="0"/>
+            <a:r>
+              <a:rPr lang="en-US" sz="8800"/>
+              <a:t>data science salary </a:t>
+            </a:r>
+            <a:r>
+              <a:rPr lang="en-US" sz="8800" dirty="0"/>
+              <a:t>prediction </a:t>
+            </a:r>
           </a:p>
         </p:txBody>
       </p:sp>
@@ -16667,7 +17047,7 @@
     </p:extLst>
   </p:cSld>
   <p:clrMapOvr>
-    <a:masterClrMapping/>
+    <a:overrideClrMapping bg1="dk1" tx1="lt1" bg2="dk2" tx2="lt2" accent1="accent1" accent2="accent2" accent3="accent3" accent4="accent4" accent5="accent5" accent6="accent6" hlink="hlink" folHlink="folHlink"/>
   </p:clrMapOvr>
 </p:sld>
 </file>

</xml_diff>